<commit_message>
knn and naive bayes
</commit_message>
<xml_diff>
--- a/docs/kNN & Naïve Bayes.pptx
+++ b/docs/kNN & Naïve Bayes.pptx
@@ -245,7 +245,7 @@
           <a:p>
             <a:fld id="{9A2D3781-CE78-4015-89C7-4E1DF9CFA5A2}" type="datetimeFigureOut">
               <a:rPr lang="en-US" smtClean="0"/>
-              <a:t>4/6/2015</a:t>
+              <a:t>3/21/2016</a:t>
             </a:fld>
             <a:endParaRPr lang="en-US"/>
           </a:p>
@@ -6852,8 +6852,13 @@
           <a:p>
             <a:r>
               <a:rPr lang="en-US" dirty="0" smtClean="0"/>
-              <a:t>Approximate solutions</a:t>
+              <a:t>Approximate </a:t>
             </a:r>
+            <a:r>
+              <a:rPr lang="en-US" dirty="0" smtClean="0"/>
+              <a:t>solution</a:t>
+            </a:r>
+            <a:endParaRPr lang="en-US" dirty="0" smtClean="0"/>
           </a:p>
           <a:p>
             <a:pPr lvl="1"/>
@@ -14275,8 +14280,8 @@
           </a:p>
         </p:txBody>
       </p:sp>
-      <mc:AlternateContent xmlns:mc="http://schemas.openxmlformats.org/markup-compatibility/2006" xmlns:a14="http://schemas.microsoft.com/office/drawing/2010/main">
-        <mc:Choice Requires="a14">
+      <mc:AlternateContent xmlns:mc="http://schemas.openxmlformats.org/markup-compatibility/2006">
+        <mc:Choice xmlns:a14="http://schemas.microsoft.com/office/drawing/2010/main" Requires="a14">
           <p:sp>
             <p:nvSpPr>
               <p:cNvPr id="3" name="Content Placeholder 2"/>
@@ -14298,7 +14303,15 @@
                 </a:r>
                 <a:r>
                   <a:rPr lang="en-US" dirty="0"/>
-                  <a:t>the cosine distance between </a:t>
+                  <a:t>the cosine </a:t>
+                </a:r>
+                <a:r>
+                  <a:rPr lang="en-US" dirty="0" smtClean="0"/>
+                  <a:t>similarity </a:t>
+                </a:r>
+                <a:r>
+                  <a:rPr lang="en-US" dirty="0" smtClean="0"/>
+                  <a:t>between </a:t>
                 </a:r>
                 <a:r>
                   <a:rPr lang="en-US" dirty="0" smtClean="0"/>
@@ -14583,7 +14596,7 @@
             </p:txBody>
           </p:sp>
         </mc:Choice>
-        <mc:Fallback xmlns="">
+        <mc:Fallback>
           <p:sp>
             <p:nvSpPr>
               <p:cNvPr id="3" name="Content Placeholder 2"/>
@@ -30268,18 +30281,14 @@
           <a:p>
             <a:r>
               <a:rPr lang="en-US" dirty="0" smtClean="0"/>
-              <a:t>Enhancing Naïve Bayes for text </a:t>
-            </a:r>
-            <a:r>
-              <a:rPr lang="en-US" dirty="0" smtClean="0"/>
-              <a:t>classification I</a:t>
+              <a:t>Enhancing Naïve Bayes for text classification I</a:t>
             </a:r>
             <a:endParaRPr lang="en-US" dirty="0"/>
           </a:p>
         </p:txBody>
       </p:sp>
-      <mc:AlternateContent xmlns:mc="http://schemas.openxmlformats.org/markup-compatibility/2006">
-        <mc:Choice xmlns:a14="http://schemas.microsoft.com/office/drawing/2010/main" Requires="a14">
+      <mc:AlternateContent xmlns:mc="http://schemas.openxmlformats.org/markup-compatibility/2006" xmlns:a14="http://schemas.microsoft.com/office/drawing/2010/main">
+        <mc:Choice Requires="a14">
           <p:sp>
             <p:nvSpPr>
               <p:cNvPr id="3" name="Content Placeholder 2"/>
@@ -30653,7 +30662,7 @@
             </p:txBody>
           </p:sp>
         </mc:Choice>
-        <mc:Fallback>
+        <mc:Fallback xmlns="">
           <p:sp>
             <p:nvSpPr>
               <p:cNvPr id="3" name="Content Placeholder 2"/>
@@ -32237,8 +32246,8 @@
           </a:p>
         </p:txBody>
       </p:sp>
-      <mc:AlternateContent xmlns:mc="http://schemas.openxmlformats.org/markup-compatibility/2006">
-        <mc:Choice xmlns:a14="http://schemas.microsoft.com/office/drawing/2010/main" Requires="a14">
+      <mc:AlternateContent xmlns:mc="http://schemas.openxmlformats.org/markup-compatibility/2006" xmlns:a14="http://schemas.microsoft.com/office/drawing/2010/main">
+        <mc:Choice Requires="a14">
           <p:sp>
             <p:nvSpPr>
               <p:cNvPr id="7" name="TextBox 6"/>
@@ -32649,7 +32658,7 @@
             </p:txBody>
           </p:sp>
         </mc:Choice>
-        <mc:Fallback>
+        <mc:Fallback xmlns="">
           <p:sp>
             <p:nvSpPr>
               <p:cNvPr id="7" name="TextBox 6"/>
@@ -32877,8 +32886,8 @@
             </a:p>
           </p:txBody>
         </p:sp>
-        <mc:AlternateContent xmlns:mc="http://schemas.openxmlformats.org/markup-compatibility/2006">
-          <mc:Choice xmlns:a14="http://schemas.microsoft.com/office/drawing/2010/main" Requires="a14">
+        <mc:AlternateContent xmlns:mc="http://schemas.openxmlformats.org/markup-compatibility/2006" xmlns:a14="http://schemas.microsoft.com/office/drawing/2010/main">
+          <mc:Choice Requires="a14">
             <p:sp>
               <p:nvSpPr>
                 <p:cNvPr id="10" name="TextBox 9"/>
@@ -33338,7 +33347,7 @@
               </p:txBody>
             </p:sp>
           </mc:Choice>
-          <mc:Fallback>
+          <mc:Fallback xmlns="">
             <p:sp>
               <p:nvSpPr>
                 <p:cNvPr id="10" name="TextBox 9"/>
@@ -33982,11 +33991,7 @@
           <a:p>
             <a:r>
               <a:rPr lang="en-US" dirty="0" smtClean="0"/>
-              <a:t>Enhancing Naïve Bayes for text </a:t>
-            </a:r>
-            <a:r>
-              <a:rPr lang="en-US" dirty="0" smtClean="0"/>
-              <a:t>classification II</a:t>
+              <a:t>Enhancing Naïve Bayes for text classification II</a:t>
             </a:r>
             <a:endParaRPr lang="en-US" dirty="0"/>
           </a:p>
@@ -34681,11 +34686,7 @@
           <a:p>
             <a:r>
               <a:rPr lang="en-US" dirty="0" smtClean="0"/>
-              <a:t>Enhancing Naïve Bayes for text </a:t>
-            </a:r>
-            <a:r>
-              <a:rPr lang="en-US" dirty="0" smtClean="0"/>
-              <a:t>classification III</a:t>
+              <a:t>Enhancing Naïve Bayes for text classification III</a:t>
             </a:r>
             <a:endParaRPr lang="en-US" dirty="0"/>
           </a:p>

</xml_diff>